<commit_message>
powerpoint + uml fix
</commit_message>
<xml_diff>
--- a/The Game of Chess.pptx
+++ b/The Game of Chess.pptx
@@ -27327,7 +27327,12 @@
             <p:ph type="sldNum" sz="quarter" idx="4"/>
           </p:nvPr>
         </p:nvSpPr>
-        <p:spPr/>
+        <p:spPr>
+          <a:xfrm>
+            <a:off x="11504676" y="6090116"/>
+            <a:ext cx="661416" cy="895899"/>
+          </a:xfrm>
+        </p:spPr>
         <p:txBody>
           <a:bodyPr/>
           <a:lstStyle/>
@@ -27363,7 +27368,7 @@
         </p:blipFill>
         <p:spPr>
           <a:xfrm>
-            <a:off x="812785" y="1160759"/>
+            <a:off x="356616" y="1160759"/>
             <a:ext cx="5283215" cy="4719045"/>
           </a:xfrm>
           <a:prstGeom prst="rect">
@@ -27373,10 +27378,10 @@
       </p:pic>
       <p:pic>
         <p:nvPicPr>
-          <p:cNvPr id="5" name="Picture 4">
+          <p:cNvPr id="6" name="Picture 5">
             <a:extLst>
               <a:ext uri="{FF2B5EF4-FFF2-40B4-BE49-F238E27FC236}">
-                <a16:creationId xmlns:a16="http://schemas.microsoft.com/office/drawing/2014/main" id="{2F202EA9-F0EA-D1F4-51C3-3AB4B4BB22E3}"/>
+                <a16:creationId xmlns:a16="http://schemas.microsoft.com/office/drawing/2014/main" id="{85BD3A2F-AF0C-0776-E132-8F46F476DB93}"/>
               </a:ext>
             </a:extLst>
           </p:cNvPr>
@@ -27393,8 +27398,8 @@
         </p:blipFill>
         <p:spPr>
           <a:xfrm>
-            <a:off x="6797977" y="261163"/>
-            <a:ext cx="3752035" cy="6335673"/>
+            <a:off x="5747004" y="405649"/>
+            <a:ext cx="6088380" cy="5953653"/>
           </a:xfrm>
           <a:prstGeom prst="rect">
             <a:avLst/>
@@ -28838,6 +28843,15 @@
 </file>
 
 <file path=customXml/item1.xml><?xml version="1.0" encoding="utf-8"?>
+<?mso-contentType ?>
+<FormTemplates xmlns="http://schemas.microsoft.com/sharepoint/v3/contenttype/forms">
+  <Display>DocumentLibraryForm</Display>
+  <Edit>DocumentLibraryForm</Edit>
+  <New>DocumentLibraryForm</New>
+</FormTemplates>
+</file>
+
+<file path=customXml/item2.xml><?xml version="1.0" encoding="utf-8"?>
 <ct:contentTypeSchema xmlns:ct="http://schemas.microsoft.com/office/2006/metadata/contentType" xmlns:ma="http://schemas.microsoft.com/office/2006/metadata/properties/metaAttributes" ct:_="" ma:_="" ma:contentTypeName="Document" ma:contentTypeID="0x01010079F111ED35F8CC479449609E8A0923A6" ma:contentTypeVersion="28" ma:contentTypeDescription="Create a new document." ma:contentTypeScope="" ma:versionID="60f5a4f2d2b0abadcf532d48ebf9cb71">
   <xsd:schema xmlns:xsd="http://www.w3.org/2001/XMLSchema" xmlns:xs="http://www.w3.org/2001/XMLSchema" xmlns:p="http://schemas.microsoft.com/office/2006/metadata/properties" xmlns:ns1="http://schemas.microsoft.com/sharepoint/v3" xmlns:ns2="71af3243-3dd4-4a8d-8c0d-dd76da1f02a5" xmlns:ns3="16c05727-aa75-4e4a-9b5f-8a80a1165891" xmlns:ns4="230e9df3-be65-4c73-a93b-d1236ebd677e" targetNamespace="http://schemas.microsoft.com/office/2006/metadata/properties" ma:root="true" ma:fieldsID="7dd78129e6a1811f84807ad11c651531" ns1:_="" ns2:_="" ns3:_="" ns4:_="">
     <xsd:import namespace="http://schemas.microsoft.com/sharepoint/v3"/>
@@ -29149,15 +29163,6 @@
 </ct:contentTypeSchema>
 </file>
 
-<file path=customXml/item2.xml><?xml version="1.0" encoding="utf-8"?>
-<?mso-contentType ?>
-<FormTemplates xmlns="http://schemas.microsoft.com/sharepoint/v3/contenttype/forms">
-  <Display>DocumentLibraryForm</Display>
-  <Edit>DocumentLibraryForm</Edit>
-  <New>DocumentLibraryForm</New>
-</FormTemplates>
-</file>
-
 <file path=customXml/item3.xml><?xml version="1.0" encoding="utf-8"?>
 <p:properties xmlns:p="http://schemas.microsoft.com/office/2006/metadata/properties" xmlns:xsi="http://www.w3.org/2001/XMLSchema-instance" xmlns:pc="http://schemas.microsoft.com/office/infopath/2007/PartnerControls">
   <documentManagement>
@@ -29179,6 +29184,14 @@
 </file>
 
 <file path=customXml/itemProps1.xml><?xml version="1.0" encoding="utf-8"?>
+<ds:datastoreItem xmlns:ds="http://schemas.openxmlformats.org/officeDocument/2006/customXml" ds:itemID="{1249AD37-9510-4A2D-B790-12C439A83F93}">
+  <ds:schemaRefs>
+    <ds:schemaRef ds:uri="http://schemas.microsoft.com/sharepoint/v3/contenttype/forms"/>
+  </ds:schemaRefs>
+</ds:datastoreItem>
+</file>
+
+<file path=customXml/itemProps2.xml><?xml version="1.0" encoding="utf-8"?>
 <ds:datastoreItem xmlns:ds="http://schemas.openxmlformats.org/officeDocument/2006/customXml" ds:itemID="{4D8B1D1D-0064-435C-8533-29A36067B8ED}">
   <ds:schemaRefs>
     <ds:schemaRef ds:uri="http://schemas.microsoft.com/office/2006/metadata/contentType"/>
@@ -29199,14 +29212,6 @@
 </ds:datastoreItem>
 </file>
 
-<file path=customXml/itemProps2.xml><?xml version="1.0" encoding="utf-8"?>
-<ds:datastoreItem xmlns:ds="http://schemas.openxmlformats.org/officeDocument/2006/customXml" ds:itemID="{1249AD37-9510-4A2D-B790-12C439A83F93}">
-  <ds:schemaRefs>
-    <ds:schemaRef ds:uri="http://schemas.microsoft.com/sharepoint/v3/contenttype/forms"/>
-  </ds:schemaRefs>
-</ds:datastoreItem>
-</file>
-
 <file path=customXml/itemProps3.xml><?xml version="1.0" encoding="utf-8"?>
 <ds:datastoreItem xmlns:ds="http://schemas.openxmlformats.org/officeDocument/2006/customXml" ds:itemID="{85DF9CEC-52C2-4D14-B2F5-11176002A8B6}">
   <ds:schemaRefs>

</xml_diff>